<commit_message>
Update ItC - Procedure 01 - ROBOTC Setup+Debug.pptx
</commit_message>
<xml_diff>
--- a/Procedures/ItC - Procedure 01 - ROBOTC Setup+Debug.pptx
+++ b/Procedures/ItC - Procedure 01 - ROBOTC Setup+Debug.pptx
@@ -110,6 +110,11 @@
       </a:defRPr>
     </a:lvl9pPr>
   </p:defaultTextStyle>
+  <p:extLst>
+    <p:ext uri="{EFAFB233-063F-42B5-8137-9DF3F51BA10A}">
+      <p15:sldGuideLst xmlns:p15="http://schemas.microsoft.com/office/powerpoint/2012/main"/>
+    </p:ext>
+  </p:extLst>
 </p:presentation>
 </file>
 
@@ -468,7 +473,7 @@
           <a:p>
             <a:fld id="{124434E0-930D-44C7-8E44-2EB47E640525}" type="datetimeFigureOut">
               <a:rPr lang="en-US" smtClean="0"/>
-              <a:t>1/9/2020</a:t>
+              <a:t>1/10/2020</a:t>
             </a:fld>
             <a:endParaRPr lang="en-US"/>
           </a:p>
@@ -666,7 +671,7 @@
           <a:p>
             <a:fld id="{124434E0-930D-44C7-8E44-2EB47E640525}" type="datetimeFigureOut">
               <a:rPr lang="en-US" smtClean="0"/>
-              <a:t>1/9/2020</a:t>
+              <a:t>1/10/2020</a:t>
             </a:fld>
             <a:endParaRPr lang="en-US"/>
           </a:p>
@@ -874,7 +879,7 @@
           <a:p>
             <a:fld id="{124434E0-930D-44C7-8E44-2EB47E640525}" type="datetimeFigureOut">
               <a:rPr lang="en-US" smtClean="0"/>
-              <a:t>1/9/2020</a:t>
+              <a:t>1/10/2020</a:t>
             </a:fld>
             <a:endParaRPr lang="en-US"/>
           </a:p>
@@ -1072,7 +1077,7 @@
           <a:p>
             <a:fld id="{124434E0-930D-44C7-8E44-2EB47E640525}" type="datetimeFigureOut">
               <a:rPr lang="en-US" smtClean="0"/>
-              <a:t>1/9/2020</a:t>
+              <a:t>1/10/2020</a:t>
             </a:fld>
             <a:endParaRPr lang="en-US"/>
           </a:p>
@@ -1347,7 +1352,7 @@
           <a:p>
             <a:fld id="{124434E0-930D-44C7-8E44-2EB47E640525}" type="datetimeFigureOut">
               <a:rPr lang="en-US" smtClean="0"/>
-              <a:t>1/9/2020</a:t>
+              <a:t>1/10/2020</a:t>
             </a:fld>
             <a:endParaRPr lang="en-US"/>
           </a:p>
@@ -1612,7 +1617,7 @@
           <a:p>
             <a:fld id="{124434E0-930D-44C7-8E44-2EB47E640525}" type="datetimeFigureOut">
               <a:rPr lang="en-US" smtClean="0"/>
-              <a:t>1/9/2020</a:t>
+              <a:t>1/10/2020</a:t>
             </a:fld>
             <a:endParaRPr lang="en-US"/>
           </a:p>
@@ -2024,7 +2029,7 @@
           <a:p>
             <a:fld id="{124434E0-930D-44C7-8E44-2EB47E640525}" type="datetimeFigureOut">
               <a:rPr lang="en-US" smtClean="0"/>
-              <a:t>1/9/2020</a:t>
+              <a:t>1/10/2020</a:t>
             </a:fld>
             <a:endParaRPr lang="en-US"/>
           </a:p>
@@ -2165,7 +2170,7 @@
           <a:p>
             <a:fld id="{124434E0-930D-44C7-8E44-2EB47E640525}" type="datetimeFigureOut">
               <a:rPr lang="en-US" smtClean="0"/>
-              <a:t>1/9/2020</a:t>
+              <a:t>1/10/2020</a:t>
             </a:fld>
             <a:endParaRPr lang="en-US"/>
           </a:p>
@@ -2278,7 +2283,7 @@
           <a:p>
             <a:fld id="{124434E0-930D-44C7-8E44-2EB47E640525}" type="datetimeFigureOut">
               <a:rPr lang="en-US" smtClean="0"/>
-              <a:t>1/9/2020</a:t>
+              <a:t>1/10/2020</a:t>
             </a:fld>
             <a:endParaRPr lang="en-US"/>
           </a:p>
@@ -2589,7 +2594,7 @@
           <a:p>
             <a:fld id="{124434E0-930D-44C7-8E44-2EB47E640525}" type="datetimeFigureOut">
               <a:rPr lang="en-US" smtClean="0"/>
-              <a:t>1/9/2020</a:t>
+              <a:t>1/10/2020</a:t>
             </a:fld>
             <a:endParaRPr lang="en-US"/>
           </a:p>
@@ -2877,7 +2882,7 @@
           <a:p>
             <a:fld id="{124434E0-930D-44C7-8E44-2EB47E640525}" type="datetimeFigureOut">
               <a:rPr lang="en-US" smtClean="0"/>
-              <a:t>1/9/2020</a:t>
+              <a:t>1/10/2020</a:t>
             </a:fld>
             <a:endParaRPr lang="en-US"/>
           </a:p>
@@ -3118,7 +3123,7 @@
           <a:p>
             <a:fld id="{124434E0-930D-44C7-8E44-2EB47E640525}" type="datetimeFigureOut">
               <a:rPr lang="en-US" smtClean="0"/>
-              <a:t>1/9/2020</a:t>
+              <a:t>1/10/2020</a:t>
             </a:fld>
             <a:endParaRPr lang="en-US"/>
           </a:p>
@@ -3604,13 +3609,7 @@
               <a:rPr lang="en-US" sz="4000" dirty="0">
                 <a:latin typeface="Gill Sans MT"/>
               </a:rPr>
-              <a:t> – ROBOTC for Vex I/</a:t>
-            </a:r>
-            <a:r>
-              <a:rPr lang="en-US" sz="4000" dirty="0" err="1">
-                <a:latin typeface="Gill Sans MT"/>
-              </a:rPr>
-              <a:t>Os</a:t>
+              <a:t> – ROBOTC Setup &amp; Debug</a:t>
             </a:r>
             <a:endParaRPr lang="en-US" sz="4000" dirty="0"/>
           </a:p>
@@ -3679,15 +3678,7 @@
               <a:rPr lang="en-US" dirty="0">
                 <a:latin typeface="Gill Sans MT"/>
               </a:rPr>
-              <a:t>Programming Outputs</a:t>
-            </a:r>
-          </a:p>
-          <a:p>
-            <a:r>
-              <a:rPr lang="en-US" dirty="0">
-                <a:latin typeface="Gill Sans MT"/>
-              </a:rPr>
-              <a:t>Programming Inputs</a:t>
+              <a:t>Cortex Debug</a:t>
             </a:r>
           </a:p>
           <a:p>
@@ -6660,18 +6651,18 @@
 </file>
 
 <file path=customXml/item2.xml><?xml version="1.0" encoding="utf-8"?>
+<p:properties xmlns:p="http://schemas.microsoft.com/office/2006/metadata/properties" xmlns:xsi="http://www.w3.org/2001/XMLSchema-instance" xmlns:pc="http://schemas.microsoft.com/office/infopath/2007/PartnerControls">
+  <documentManagement/>
+</p:properties>
+</file>
+
+<file path=customXml/item3.xml><?xml version="1.0" encoding="utf-8"?>
 <?mso-contentType ?>
 <FormTemplates xmlns="http://schemas.microsoft.com/sharepoint/v3/contenttype/forms">
   <Display>DocumentLibraryForm</Display>
   <Edit>DocumentLibraryForm</Edit>
   <New>DocumentLibraryForm</New>
 </FormTemplates>
-</file>
-
-<file path=customXml/item3.xml><?xml version="1.0" encoding="utf-8"?>
-<p:properties xmlns:p="http://schemas.microsoft.com/office/2006/metadata/properties" xmlns:xsi="http://www.w3.org/2001/XMLSchema-instance" xmlns:pc="http://schemas.microsoft.com/office/infopath/2007/PartnerControls">
-  <documentManagement/>
-</p:properties>
 </file>
 
 <file path=customXml/itemProps1.xml><?xml version="1.0" encoding="utf-8"?>
@@ -6694,14 +6685,6 @@
 </file>
 
 <file path=customXml/itemProps2.xml><?xml version="1.0" encoding="utf-8"?>
-<ds:datastoreItem xmlns:ds="http://schemas.openxmlformats.org/officeDocument/2006/customXml" ds:itemID="{47DC32A7-81A2-4FF8-8601-D53B8F3609D0}">
-  <ds:schemaRefs>
-    <ds:schemaRef ds:uri="http://schemas.microsoft.com/sharepoint/v3/contenttype/forms"/>
-  </ds:schemaRefs>
-</ds:datastoreItem>
-</file>
-
-<file path=customXml/itemProps3.xml><?xml version="1.0" encoding="utf-8"?>
 <ds:datastoreItem xmlns:ds="http://schemas.openxmlformats.org/officeDocument/2006/customXml" ds:itemID="{4DEF275F-4D14-42BB-B062-39E39121DDB6}">
   <ds:schemaRefs>
     <ds:schemaRef ds:uri="0763945f-b588-479b-8b34-69271d6243d3"/>
@@ -6716,4 +6699,12 @@
     <ds:schemaRef ds:uri="http://schemas.microsoft.com/office/2006/metadata/properties"/>
   </ds:schemaRefs>
 </ds:datastoreItem>
+</file>
+
+<file path=customXml/itemProps3.xml><?xml version="1.0" encoding="utf-8"?>
+<ds:datastoreItem xmlns:ds="http://schemas.openxmlformats.org/officeDocument/2006/customXml" ds:itemID="{47DC32A7-81A2-4FF8-8601-D53B8F3609D0}">
+  <ds:schemaRefs>
+    <ds:schemaRef ds:uri="http://schemas.microsoft.com/sharepoint/v3/contenttype/forms"/>
+  </ds:schemaRefs>
+</ds:datastoreItem>
 </file>
</xml_diff>